<commit_message>
Update figure + description of the bitstream formation
</commit_message>
<xml_diff>
--- a/doc/test_model/images/4_encoder/v3c_miv_sample_stream.pptx
+++ b/doc/test_model/images/4_encoder/v3c_miv_sample_stream.pptx
@@ -197,7 +197,7 @@
           <a:p>
             <a:fld id="{F158D50A-45A0-48F6-8AD9-0F53C3AA89D7}" type="datetimeFigureOut">
               <a:rPr lang="en-US" smtClean="0"/>
-              <a:t>2021-01-12</a:t>
+              <a:t>1/28/2021</a:t>
             </a:fld>
             <a:endParaRPr lang="en-US"/>
           </a:p>
@@ -685,7 +685,7 @@
           <a:p>
             <a:fld id="{740F5C02-262D-4A5D-8B31-B89C1E5007F6}" type="datetimeFigureOut">
               <a:rPr lang="en-US" smtClean="0"/>
-              <a:t>2021-01-12</a:t>
+              <a:t>1/28/2021</a:t>
             </a:fld>
             <a:endParaRPr lang="en-US"/>
           </a:p>
@@ -853,7 +853,7 @@
           <a:p>
             <a:fld id="{740F5C02-262D-4A5D-8B31-B89C1E5007F6}" type="datetimeFigureOut">
               <a:rPr lang="en-US" smtClean="0"/>
-              <a:t>2021-01-12</a:t>
+              <a:t>1/28/2021</a:t>
             </a:fld>
             <a:endParaRPr lang="en-US"/>
           </a:p>
@@ -1031,7 +1031,7 @@
           <a:p>
             <a:fld id="{740F5C02-262D-4A5D-8B31-B89C1E5007F6}" type="datetimeFigureOut">
               <a:rPr lang="en-US" smtClean="0"/>
-              <a:t>2021-01-12</a:t>
+              <a:t>1/28/2021</a:t>
             </a:fld>
             <a:endParaRPr lang="en-US"/>
           </a:p>
@@ -1199,7 +1199,7 @@
           <a:p>
             <a:fld id="{740F5C02-262D-4A5D-8B31-B89C1E5007F6}" type="datetimeFigureOut">
               <a:rPr lang="en-US" smtClean="0"/>
-              <a:t>2021-01-12</a:t>
+              <a:t>1/28/2021</a:t>
             </a:fld>
             <a:endParaRPr lang="en-US"/>
           </a:p>
@@ -1444,7 +1444,7 @@
           <a:p>
             <a:fld id="{740F5C02-262D-4A5D-8B31-B89C1E5007F6}" type="datetimeFigureOut">
               <a:rPr lang="en-US" smtClean="0"/>
-              <a:t>2021-01-12</a:t>
+              <a:t>1/28/2021</a:t>
             </a:fld>
             <a:endParaRPr lang="en-US"/>
           </a:p>
@@ -1673,7 +1673,7 @@
           <a:p>
             <a:fld id="{740F5C02-262D-4A5D-8B31-B89C1E5007F6}" type="datetimeFigureOut">
               <a:rPr lang="en-US" smtClean="0"/>
-              <a:t>2021-01-12</a:t>
+              <a:t>1/28/2021</a:t>
             </a:fld>
             <a:endParaRPr lang="en-US"/>
           </a:p>
@@ -2037,7 +2037,7 @@
           <a:p>
             <a:fld id="{740F5C02-262D-4A5D-8B31-B89C1E5007F6}" type="datetimeFigureOut">
               <a:rPr lang="en-US" smtClean="0"/>
-              <a:t>2021-01-12</a:t>
+              <a:t>1/28/2021</a:t>
             </a:fld>
             <a:endParaRPr lang="en-US"/>
           </a:p>
@@ -2154,7 +2154,7 @@
           <a:p>
             <a:fld id="{740F5C02-262D-4A5D-8B31-B89C1E5007F6}" type="datetimeFigureOut">
               <a:rPr lang="en-US" smtClean="0"/>
-              <a:t>2021-01-12</a:t>
+              <a:t>1/28/2021</a:t>
             </a:fld>
             <a:endParaRPr lang="en-US"/>
           </a:p>
@@ -2249,7 +2249,7 @@
           <a:p>
             <a:fld id="{740F5C02-262D-4A5D-8B31-B89C1E5007F6}" type="datetimeFigureOut">
               <a:rPr lang="en-US" smtClean="0"/>
-              <a:t>2021-01-12</a:t>
+              <a:t>1/28/2021</a:t>
             </a:fld>
             <a:endParaRPr lang="en-US"/>
           </a:p>
@@ -2524,7 +2524,7 @@
           <a:p>
             <a:fld id="{740F5C02-262D-4A5D-8B31-B89C1E5007F6}" type="datetimeFigureOut">
               <a:rPr lang="en-US" smtClean="0"/>
-              <a:t>2021-01-12</a:t>
+              <a:t>1/28/2021</a:t>
             </a:fld>
             <a:endParaRPr lang="en-US"/>
           </a:p>
@@ -2776,7 +2776,7 @@
           <a:p>
             <a:fld id="{740F5C02-262D-4A5D-8B31-B89C1E5007F6}" type="datetimeFigureOut">
               <a:rPr lang="en-US" smtClean="0"/>
-              <a:t>2021-01-12</a:t>
+              <a:t>1/28/2021</a:t>
             </a:fld>
             <a:endParaRPr lang="en-US"/>
           </a:p>
@@ -2987,7 +2987,7 @@
           <a:p>
             <a:fld id="{740F5C02-262D-4A5D-8B31-B89C1E5007F6}" type="datetimeFigureOut">
               <a:rPr lang="en-US" smtClean="0"/>
-              <a:t>2021-01-12</a:t>
+              <a:t>1/28/2021</a:t>
             </a:fld>
             <a:endParaRPr lang="en-US"/>
           </a:p>
@@ -3394,14 +3394,20 @@
       </p:grpSpPr>
       <p:sp>
         <p:nvSpPr>
-          <p:cNvPr id="61" name="TextBox 60"/>
-          <p:cNvSpPr txBox="1"/>
+          <p:cNvPr id="2" name="Rectangle 1">
+            <a:extLst>
+              <a:ext uri="{FF2B5EF4-FFF2-40B4-BE49-F238E27FC236}">
+                <a16:creationId xmlns:a16="http://schemas.microsoft.com/office/drawing/2014/main" id="{4F8D6152-0E3B-45A5-84D7-4899DA5ABDEA}"/>
+              </a:ext>
+            </a:extLst>
+          </p:cNvPr>
+          <p:cNvSpPr/>
           <p:nvPr/>
         </p:nvSpPr>
         <p:spPr>
           <a:xfrm>
-            <a:off x="3283876" y="2617870"/>
-            <a:ext cx="2373401" cy="353371"/>
+            <a:off x="0" y="0"/>
+            <a:ext cx="16440150" cy="6858000"/>
           </a:xfrm>
           <a:prstGeom prst="rect">
             <a:avLst/>
@@ -3409,85 +3415,6 @@
           <a:solidFill>
             <a:schemeClr val="bg1"/>
           </a:solidFill>
-        </p:spPr>
-        <p:txBody>
-          <a:bodyPr wrap="none" rtlCol="0">
-            <a:spAutoFit/>
-          </a:bodyPr>
-          <a:lstStyle/>
-          <a:p>
-            <a:r>
-              <a:rPr lang="en-US">
-                <a:latin typeface="Arial"/>
-                <a:cs typeface="Arial"/>
-              </a:rPr>
-              <a:t>Intermediate bitstream</a:t>
-            </a:r>
-          </a:p>
-        </p:txBody>
-      </p:sp>
-      <p:sp>
-        <p:nvSpPr>
-          <p:cNvPr id="63" name="TextBox 62"/>
-          <p:cNvSpPr txBox="1"/>
-          <p:nvPr/>
-        </p:nvSpPr>
-        <p:spPr>
-          <a:xfrm>
-            <a:off x="6888985" y="2626390"/>
-            <a:ext cx="3612872" cy="559504"/>
-          </a:xfrm>
-          <a:prstGeom prst="rect">
-            <a:avLst/>
-          </a:prstGeom>
-          <a:solidFill>
-            <a:schemeClr val="bg1"/>
-          </a:solidFill>
-        </p:spPr>
-        <p:txBody>
-          <a:bodyPr wrap="none" rtlCol="0">
-            <a:spAutoFit/>
-          </a:bodyPr>
-          <a:lstStyle/>
-          <a:p>
-            <a:pPr algn="ctr"/>
-            <a:r>
-              <a:rPr lang="en-US">
-                <a:latin typeface="Arial"/>
-                <a:cs typeface="Arial"/>
-              </a:rPr>
-              <a:t>Appended in the multiplexing stage</a:t>
-            </a:r>
-            <a:br>
-              <a:rPr lang="en-US">
-                <a:latin typeface="Arial"/>
-                <a:cs typeface="Arial"/>
-              </a:rPr>
-            </a:br>
-            <a:r>
-              <a:rPr lang="en-US" sz="1400">
-                <a:latin typeface="Arial"/>
-                <a:cs typeface="Arial"/>
-              </a:rPr>
-              <a:t>(all video sub bitstreams)</a:t>
-            </a:r>
-          </a:p>
-        </p:txBody>
-      </p:sp>
-      <p:sp>
-        <p:nvSpPr>
-          <p:cNvPr id="19" name="Rectangle 18"/>
-          <p:cNvSpPr/>
-          <p:nvPr/>
-        </p:nvSpPr>
-        <p:spPr>
-          <a:xfrm>
-            <a:off x="123171" y="3257221"/>
-            <a:ext cx="2830061" cy="1690971"/>
-          </a:xfrm>
-          <a:prstGeom prst="rect">
-            <a:avLst/>
-          </a:prstGeom>
         </p:spPr>
         <p:style>
           <a:lnRef idx="2">
@@ -3506,74 +3433,106 @@
           </a:fontRef>
         </p:style>
         <p:txBody>
-          <a:bodyPr lIns="91440" tIns="45720" rIns="91440" bIns="45720" rtlCol="0" anchor="t"/>
+          <a:bodyPr rtlCol="0" anchor="ctr"/>
           <a:lstStyle/>
           <a:p>
             <a:pPr algn="ctr"/>
-            <a:r>
-              <a:rPr lang="en-US" sz="1600" u="sng">
+            <a:endParaRPr lang="en-US"/>
+          </a:p>
+        </p:txBody>
+      </p:sp>
+      <p:sp>
+        <p:nvSpPr>
+          <p:cNvPr id="61" name="TextBox 60"/>
+          <p:cNvSpPr txBox="1"/>
+          <p:nvPr/>
+        </p:nvSpPr>
+        <p:spPr>
+          <a:xfrm>
+            <a:off x="3283876" y="2865704"/>
+            <a:ext cx="2373401" cy="353371"/>
+          </a:xfrm>
+          <a:prstGeom prst="rect">
+            <a:avLst/>
+          </a:prstGeom>
+          <a:solidFill>
+            <a:schemeClr val="bg1"/>
+          </a:solidFill>
+        </p:spPr>
+        <p:txBody>
+          <a:bodyPr wrap="none" rtlCol="0">
+            <a:spAutoFit/>
+          </a:bodyPr>
+          <a:lstStyle/>
+          <a:p>
+            <a:r>
+              <a:rPr lang="en-US">
                 <a:latin typeface="Arial"/>
                 <a:cs typeface="Arial"/>
               </a:rPr>
-              <a:t>Common atlas data (CAD)</a:t>
-            </a:r>
-          </a:p>
-        </p:txBody>
-      </p:sp>
-      <p:sp>
-        <p:nvSpPr>
-          <p:cNvPr id="31" name="Rectangle 30"/>
-          <p:cNvSpPr/>
+              <a:t>Intermediate bitstream</a:t>
+            </a:r>
+          </a:p>
+        </p:txBody>
+      </p:sp>
+      <p:sp>
+        <p:nvSpPr>
+          <p:cNvPr id="63" name="TextBox 62"/>
+          <p:cNvSpPr txBox="1"/>
           <p:nvPr/>
         </p:nvSpPr>
         <p:spPr>
           <a:xfrm>
-            <a:off x="365682" y="3703139"/>
-            <a:ext cx="2368789" cy="1009507"/>
+            <a:off x="11722813" y="2656301"/>
+            <a:ext cx="3612872" cy="559504"/>
           </a:xfrm>
           <a:prstGeom prst="rect">
             <a:avLst/>
           </a:prstGeom>
-        </p:spPr>
-        <p:style>
-          <a:lnRef idx="2">
-            <a:schemeClr val="dk1"/>
-          </a:lnRef>
-          <a:fillRef idx="1">
-            <a:schemeClr val="lt1"/>
-          </a:fillRef>
-          <a:effectRef idx="0">
-            <a:schemeClr val="dk1"/>
-          </a:effectRef>
-          <a:fontRef idx="minor">
-            <a:schemeClr val="dk1"/>
-          </a:fontRef>
-        </p:style>
-        <p:txBody>
-          <a:bodyPr rtlCol="0" anchor="t"/>
+          <a:solidFill>
+            <a:schemeClr val="bg1"/>
+          </a:solidFill>
+        </p:spPr>
+        <p:txBody>
+          <a:bodyPr wrap="none" rtlCol="0">
+            <a:spAutoFit/>
+          </a:bodyPr>
           <a:lstStyle/>
           <a:p>
             <a:pPr algn="ctr"/>
             <a:r>
-              <a:rPr lang="en-US" sz="1600">
+              <a:rPr lang="en-US" dirty="0">
                 <a:latin typeface="Arial"/>
                 <a:cs typeface="Arial"/>
               </a:rPr>
-              <a:t>Common atlas sequence parameter set</a:t>
-            </a:r>
-          </a:p>
-        </p:txBody>
-      </p:sp>
-      <p:sp>
-        <p:nvSpPr>
-          <p:cNvPr id="32" name="Rectangle 31"/>
+              <a:t>Appended in the multiplexing stage</a:t>
+            </a:r>
+            <a:br>
+              <a:rPr lang="en-US" dirty="0">
+                <a:latin typeface="Arial"/>
+                <a:cs typeface="Arial"/>
+              </a:rPr>
+            </a:br>
+            <a:r>
+              <a:rPr lang="en-US" sz="1400" dirty="0">
+                <a:latin typeface="Arial"/>
+                <a:cs typeface="Arial"/>
+              </a:rPr>
+              <a:t>(all video sub bitstreams)</a:t>
+            </a:r>
+          </a:p>
+        </p:txBody>
+      </p:sp>
+      <p:sp>
+        <p:nvSpPr>
+          <p:cNvPr id="19" name="Rectangle 18"/>
           <p:cNvSpPr/>
           <p:nvPr/>
         </p:nvSpPr>
         <p:spPr>
           <a:xfrm>
-            <a:off x="3233079" y="3257221"/>
-            <a:ext cx="8125559" cy="1690971"/>
+            <a:off x="123171" y="3257221"/>
+            <a:ext cx="4342144" cy="1690971"/>
           </a:xfrm>
           <a:prstGeom prst="rect">
             <a:avLst/>
@@ -3596,30 +3555,30 @@
           </a:fontRef>
         </p:style>
         <p:txBody>
-          <a:bodyPr rtlCol="0" anchor="t"/>
+          <a:bodyPr lIns="91440" tIns="45720" rIns="91440" bIns="45720" rtlCol="0" anchor="t"/>
           <a:lstStyle/>
           <a:p>
             <a:pPr algn="ctr"/>
             <a:r>
-              <a:rPr lang="en-US" u="sng">
+              <a:rPr lang="en-US" sz="1600" u="sng" dirty="0">
                 <a:latin typeface="Arial"/>
                 <a:cs typeface="Arial"/>
               </a:rPr>
-              <a:t>Atlas data (AD)</a:t>
-            </a:r>
-          </a:p>
-        </p:txBody>
-      </p:sp>
-      <p:sp>
-        <p:nvSpPr>
-          <p:cNvPr id="35" name="Rectangle 34"/>
+              <a:t>Common atlas data (CAD)</a:t>
+            </a:r>
+          </a:p>
+        </p:txBody>
+      </p:sp>
+      <p:sp>
+        <p:nvSpPr>
+          <p:cNvPr id="31" name="Rectangle 30"/>
           <p:cNvSpPr/>
           <p:nvPr/>
         </p:nvSpPr>
         <p:spPr>
           <a:xfrm>
-            <a:off x="5697972" y="3703139"/>
-            <a:ext cx="915271" cy="1009507"/>
+            <a:off x="331498" y="3703139"/>
+            <a:ext cx="1734535" cy="1009507"/>
           </a:xfrm>
           <a:prstGeom prst="rect">
             <a:avLst/>
@@ -3640,74 +3599,30 @@
           </a:fontRef>
         </p:style>
         <p:txBody>
-          <a:bodyPr lIns="91440" tIns="45720" rIns="91440" bIns="45720" rtlCol="0" anchor="ctr"/>
+          <a:bodyPr rtlCol="0" anchor="t"/>
           <a:lstStyle/>
           <a:p>
             <a:pPr algn="ctr"/>
             <a:r>
-              <a:rPr lang="en-US" sz="1300">
+              <a:rPr lang="en-US" sz="1400" dirty="0">
                 <a:latin typeface="Arial"/>
                 <a:cs typeface="Arial"/>
               </a:rPr>
-              <a:t>Atlas tile layer (patches)</a:t>
-            </a:r>
-          </a:p>
-        </p:txBody>
-      </p:sp>
-      <p:sp>
-        <p:nvSpPr>
-          <p:cNvPr id="33" name="Rectangle 32"/>
+              <a:t>Common atlas sequence parameter set (CASPS)</a:t>
+            </a:r>
+          </a:p>
+        </p:txBody>
+      </p:sp>
+      <p:sp>
+        <p:nvSpPr>
+          <p:cNvPr id="32" name="Rectangle 31"/>
           <p:cNvSpPr/>
           <p:nvPr/>
         </p:nvSpPr>
         <p:spPr>
           <a:xfrm>
-            <a:off x="3449325" y="3703140"/>
-            <a:ext cx="964310" cy="1009507"/>
-          </a:xfrm>
-          <a:prstGeom prst="rect">
-            <a:avLst/>
-          </a:prstGeom>
-        </p:spPr>
-        <p:style>
-          <a:lnRef idx="2">
-            <a:schemeClr val="dk1"/>
-          </a:lnRef>
-          <a:fillRef idx="1">
-            <a:schemeClr val="lt1"/>
-          </a:fillRef>
-          <a:effectRef idx="0">
-            <a:schemeClr val="dk1"/>
-          </a:effectRef>
-          <a:fontRef idx="minor">
-            <a:schemeClr val="dk1"/>
-          </a:fontRef>
-        </p:style>
-        <p:txBody>
-          <a:bodyPr lIns="91440" tIns="45720" rIns="91440" bIns="45720" rtlCol="0" anchor="ctr"/>
-          <a:lstStyle/>
-          <a:p>
-            <a:pPr algn="ctr"/>
-            <a:r>
-              <a:rPr lang="en-US" sz="1400">
-                <a:latin typeface="Arial"/>
-                <a:cs typeface="Arial"/>
-              </a:rPr>
-              <a:t>Atlas sequence param. set</a:t>
-            </a:r>
-          </a:p>
-        </p:txBody>
-      </p:sp>
-      <p:sp>
-        <p:nvSpPr>
-          <p:cNvPr id="42" name="Rectangle 41"/>
-          <p:cNvSpPr/>
-          <p:nvPr/>
-        </p:nvSpPr>
-        <p:spPr>
-          <a:xfrm>
-            <a:off x="126187" y="977562"/>
-            <a:ext cx="11971364" cy="1329151"/>
+            <a:off x="4682802" y="3257221"/>
+            <a:ext cx="3763141" cy="1690971"/>
           </a:xfrm>
           <a:prstGeom prst="rect">
             <a:avLst/>
@@ -3735,25 +3650,25 @@
           <a:p>
             <a:pPr algn="ctr"/>
             <a:r>
-              <a:rPr lang="en-US" u="sng">
+              <a:rPr lang="en-US" sz="1600" u="sng" dirty="0">
                 <a:latin typeface="Arial"/>
                 <a:cs typeface="Arial"/>
               </a:rPr>
-              <a:t>V3C sample stream (one file)</a:t>
-            </a:r>
-          </a:p>
-        </p:txBody>
-      </p:sp>
-      <p:sp>
-        <p:nvSpPr>
-          <p:cNvPr id="43" name="Rectangle 42"/>
+              <a:t>Atlas data (AD)</a:t>
+            </a:r>
+          </a:p>
+        </p:txBody>
+      </p:sp>
+      <p:sp>
+        <p:nvSpPr>
+          <p:cNvPr id="35" name="Rectangle 34"/>
           <p:cNvSpPr/>
           <p:nvPr/>
         </p:nvSpPr>
         <p:spPr>
           <a:xfrm>
-            <a:off x="322142" y="1372941"/>
-            <a:ext cx="1035820" cy="773939"/>
+            <a:off x="7147695" y="3703139"/>
+            <a:ext cx="1155243" cy="1009507"/>
           </a:xfrm>
           <a:prstGeom prst="rect">
             <a:avLst/>
@@ -3779,25 +3694,35 @@
           <a:p>
             <a:pPr algn="ctr"/>
             <a:r>
-              <a:rPr lang="en-US" sz="1400">
+              <a:rPr lang="en-US" sz="1400" dirty="0">
                 <a:latin typeface="Arial"/>
                 <a:cs typeface="Arial"/>
               </a:rPr>
-              <a:t>V3C parameter set</a:t>
-            </a:r>
-          </a:p>
-        </p:txBody>
-      </p:sp>
-      <p:sp>
-        <p:nvSpPr>
-          <p:cNvPr id="44" name="Rectangle 43"/>
+              <a:t>Atlas tile layer (patches)</a:t>
+            </a:r>
+          </a:p>
+          <a:p>
+            <a:pPr algn="ctr"/>
+            <a:r>
+              <a:rPr lang="en-US" sz="1400" dirty="0">
+                <a:latin typeface="Arial"/>
+                <a:cs typeface="Arial"/>
+              </a:rPr>
+              <a:t>(IDR_N_LP)</a:t>
+            </a:r>
+          </a:p>
+        </p:txBody>
+      </p:sp>
+      <p:sp>
+        <p:nvSpPr>
+          <p:cNvPr id="33" name="Rectangle 32"/>
           <p:cNvSpPr/>
           <p:nvPr/>
         </p:nvSpPr>
         <p:spPr>
           <a:xfrm>
-            <a:off x="1890469" y="1364514"/>
-            <a:ext cx="947720" cy="782366"/>
+            <a:off x="4828476" y="3703140"/>
+            <a:ext cx="1034882" cy="1009507"/>
           </a:xfrm>
           <a:prstGeom prst="rect">
             <a:avLst/>
@@ -3823,38 +3748,71 @@
           <a:p>
             <a:pPr algn="ctr"/>
             <a:r>
-              <a:rPr lang="en-US" sz="1400">
+              <a:rPr lang="en-US" sz="1400" dirty="0">
                 <a:latin typeface="Arial"/>
                 <a:cs typeface="Arial"/>
               </a:rPr>
-              <a:t>Common</a:t>
-            </a:r>
-            <a:br>
-              <a:rPr lang="en-US" sz="1400">
+              <a:t>Atlas sequence param. set (ASPS)</a:t>
+            </a:r>
+          </a:p>
+        </p:txBody>
+      </p:sp>
+      <p:sp>
+        <p:nvSpPr>
+          <p:cNvPr id="42" name="Rectangle 41"/>
+          <p:cNvSpPr/>
+          <p:nvPr/>
+        </p:nvSpPr>
+        <p:spPr>
+          <a:xfrm>
+            <a:off x="126186" y="977562"/>
+            <a:ext cx="16155214" cy="1329151"/>
+          </a:xfrm>
+          <a:prstGeom prst="rect">
+            <a:avLst/>
+          </a:prstGeom>
+        </p:spPr>
+        <p:style>
+          <a:lnRef idx="2">
+            <a:schemeClr val="accent1">
+              <a:shade val="50000"/>
+            </a:schemeClr>
+          </a:lnRef>
+          <a:fillRef idx="1">
+            <a:schemeClr val="accent1"/>
+          </a:fillRef>
+          <a:effectRef idx="0">
+            <a:schemeClr val="accent1"/>
+          </a:effectRef>
+          <a:fontRef idx="minor">
+            <a:schemeClr val="lt1"/>
+          </a:fontRef>
+        </p:style>
+        <p:txBody>
+          <a:bodyPr rtlCol="0" anchor="t"/>
+          <a:lstStyle/>
+          <a:p>
+            <a:pPr algn="ctr"/>
+            <a:r>
+              <a:rPr lang="en-US" u="sng" dirty="0">
                 <a:latin typeface="Arial"/>
                 <a:cs typeface="Arial"/>
               </a:rPr>
-            </a:br>
-            <a:r>
-              <a:rPr lang="en-US" sz="1400">
-                <a:latin typeface="Arial"/>
-                <a:cs typeface="Arial"/>
-              </a:rPr>
-              <a:t>atlas data</a:t>
-            </a:r>
-          </a:p>
-        </p:txBody>
-      </p:sp>
-      <p:sp>
-        <p:nvSpPr>
-          <p:cNvPr id="45" name="Rectangle 44"/>
+              <a:t>V3C sample stream (one file)</a:t>
+            </a:r>
+          </a:p>
+        </p:txBody>
+      </p:sp>
+      <p:sp>
+        <p:nvSpPr>
+          <p:cNvPr id="43" name="Rectangle 42"/>
           <p:cNvSpPr/>
           <p:nvPr/>
         </p:nvSpPr>
         <p:spPr>
           <a:xfrm>
-            <a:off x="3307581" y="1364521"/>
-            <a:ext cx="662347" cy="782358"/>
+            <a:off x="322142" y="1372941"/>
+            <a:ext cx="1035820" cy="773939"/>
           </a:xfrm>
           <a:prstGeom prst="rect">
             <a:avLst/>
@@ -3880,35 +3838,25 @@
           <a:p>
             <a:pPr algn="ctr"/>
             <a:r>
-              <a:rPr lang="en-US" sz="1400">
+              <a:rPr lang="en-US" sz="1400" dirty="0">
                 <a:latin typeface="Arial"/>
                 <a:cs typeface="Arial"/>
               </a:rPr>
-              <a:t>Atlas</a:t>
-            </a:r>
-          </a:p>
-          <a:p>
-            <a:pPr algn="ctr"/>
-            <a:r>
-              <a:rPr lang="en-US" sz="1400">
-                <a:latin typeface="Arial"/>
-                <a:cs typeface="Arial"/>
-              </a:rPr>
-              <a:t>data</a:t>
-            </a:r>
-          </a:p>
-        </p:txBody>
-      </p:sp>
-      <p:sp>
-        <p:nvSpPr>
-          <p:cNvPr id="46" name="Rectangle 45"/>
+              <a:t>V3C parameter set (VPS)</a:t>
+            </a:r>
+          </a:p>
+        </p:txBody>
+      </p:sp>
+      <p:sp>
+        <p:nvSpPr>
+          <p:cNvPr id="44" name="Rectangle 43"/>
           <p:cNvSpPr/>
           <p:nvPr/>
         </p:nvSpPr>
         <p:spPr>
           <a:xfrm>
-            <a:off x="5291641" y="1372941"/>
-            <a:ext cx="1044234" cy="773935"/>
+            <a:off x="1434189" y="1372933"/>
+            <a:ext cx="1011337" cy="782366"/>
           </a:xfrm>
           <a:prstGeom prst="rect">
             <a:avLst/>
@@ -3934,25 +3882,38 @@
           <a:p>
             <a:pPr algn="ctr"/>
             <a:r>
-              <a:rPr lang="en-US" sz="1400">
+              <a:rPr lang="en-US" sz="1400" dirty="0">
                 <a:latin typeface="Arial"/>
                 <a:cs typeface="Arial"/>
               </a:rPr>
-              <a:t>Geometry video data</a:t>
-            </a:r>
-          </a:p>
-        </p:txBody>
-      </p:sp>
-      <p:sp>
-        <p:nvSpPr>
-          <p:cNvPr id="47" name="Rectangle 46"/>
+              <a:t>Common</a:t>
+            </a:r>
+            <a:br>
+              <a:rPr lang="en-US" sz="1400" dirty="0">
+                <a:latin typeface="Arial"/>
+                <a:cs typeface="Arial"/>
+              </a:rPr>
+            </a:br>
+            <a:r>
+              <a:rPr lang="en-US" sz="1400" dirty="0">
+                <a:latin typeface="Arial"/>
+                <a:cs typeface="Arial"/>
+              </a:rPr>
+              <a:t>atlas data (CAD)</a:t>
+            </a:r>
+          </a:p>
+        </p:txBody>
+      </p:sp>
+      <p:sp>
+        <p:nvSpPr>
+          <p:cNvPr id="45" name="Rectangle 44"/>
           <p:cNvSpPr/>
           <p:nvPr/>
         </p:nvSpPr>
         <p:spPr>
           <a:xfrm>
-            <a:off x="6367545" y="1364513"/>
-            <a:ext cx="1044233" cy="778812"/>
+            <a:off x="2504864" y="1370656"/>
+            <a:ext cx="662347" cy="782358"/>
           </a:xfrm>
           <a:prstGeom prst="rect">
             <a:avLst/>
@@ -3978,25 +3939,35 @@
           <a:p>
             <a:pPr algn="ctr"/>
             <a:r>
-              <a:rPr lang="en-US" sz="1400">
+              <a:rPr lang="en-US" sz="1400" dirty="0">
                 <a:latin typeface="Arial"/>
                 <a:cs typeface="Arial"/>
               </a:rPr>
-              <a:t>Attribute video data</a:t>
-            </a:r>
-          </a:p>
-        </p:txBody>
-      </p:sp>
-      <p:sp>
-        <p:nvSpPr>
-          <p:cNvPr id="48" name="Rectangle 47"/>
+              <a:t>Atlas</a:t>
+            </a:r>
+          </a:p>
+          <a:p>
+            <a:pPr algn="ctr"/>
+            <a:r>
+              <a:rPr lang="en-US" sz="1400" dirty="0">
+                <a:latin typeface="Arial"/>
+                <a:cs typeface="Arial"/>
+              </a:rPr>
+              <a:t>data (AD)</a:t>
+            </a:r>
+          </a:p>
+        </p:txBody>
+      </p:sp>
+      <p:sp>
+        <p:nvSpPr>
+          <p:cNvPr id="46" name="Rectangle 45"/>
           <p:cNvSpPr/>
           <p:nvPr/>
         </p:nvSpPr>
         <p:spPr>
           <a:xfrm>
-            <a:off x="4418258" y="1364514"/>
-            <a:ext cx="667947" cy="782358"/>
+            <a:off x="7310941" y="1372941"/>
+            <a:ext cx="1044234" cy="773935"/>
           </a:xfrm>
           <a:prstGeom prst="rect">
             <a:avLst/>
@@ -4022,7 +3993,95 @@
           <a:p>
             <a:pPr algn="ctr"/>
             <a:r>
-              <a:rPr lang="en-US" sz="1400">
+              <a:rPr lang="en-US" sz="1400" dirty="0">
+                <a:latin typeface="Arial"/>
+                <a:cs typeface="Arial"/>
+              </a:rPr>
+              <a:t>Geometry video data (GVD)</a:t>
+            </a:r>
+          </a:p>
+        </p:txBody>
+      </p:sp>
+      <p:sp>
+        <p:nvSpPr>
+          <p:cNvPr id="47" name="Rectangle 46"/>
+          <p:cNvSpPr/>
+          <p:nvPr/>
+        </p:nvSpPr>
+        <p:spPr>
+          <a:xfrm>
+            <a:off x="8386845" y="1364513"/>
+            <a:ext cx="1044233" cy="778812"/>
+          </a:xfrm>
+          <a:prstGeom prst="rect">
+            <a:avLst/>
+          </a:prstGeom>
+        </p:spPr>
+        <p:style>
+          <a:lnRef idx="2">
+            <a:schemeClr val="dk1"/>
+          </a:lnRef>
+          <a:fillRef idx="1">
+            <a:schemeClr val="lt1"/>
+          </a:fillRef>
+          <a:effectRef idx="0">
+            <a:schemeClr val="dk1"/>
+          </a:effectRef>
+          <a:fontRef idx="minor">
+            <a:schemeClr val="dk1"/>
+          </a:fontRef>
+        </p:style>
+        <p:txBody>
+          <a:bodyPr lIns="91440" tIns="45720" rIns="91440" bIns="45720" rtlCol="0" anchor="ctr"/>
+          <a:lstStyle/>
+          <a:p>
+            <a:pPr algn="ctr"/>
+            <a:r>
+              <a:rPr lang="en-US" sz="1400" dirty="0">
+                <a:latin typeface="Arial"/>
+                <a:cs typeface="Arial"/>
+              </a:rPr>
+              <a:t>Attribute video data (AVD)</a:t>
+            </a:r>
+          </a:p>
+        </p:txBody>
+      </p:sp>
+      <p:sp>
+        <p:nvSpPr>
+          <p:cNvPr id="48" name="Rectangle 47"/>
+          <p:cNvSpPr/>
+          <p:nvPr/>
+        </p:nvSpPr>
+        <p:spPr>
+          <a:xfrm>
+            <a:off x="3615541" y="1370649"/>
+            <a:ext cx="667947" cy="782358"/>
+          </a:xfrm>
+          <a:prstGeom prst="rect">
+            <a:avLst/>
+          </a:prstGeom>
+        </p:spPr>
+        <p:style>
+          <a:lnRef idx="2">
+            <a:schemeClr val="dk1"/>
+          </a:lnRef>
+          <a:fillRef idx="1">
+            <a:schemeClr val="lt1"/>
+          </a:fillRef>
+          <a:effectRef idx="0">
+            <a:schemeClr val="dk1"/>
+          </a:effectRef>
+          <a:fontRef idx="minor">
+            <a:schemeClr val="dk1"/>
+          </a:fontRef>
+        </p:style>
+        <p:txBody>
+          <a:bodyPr lIns="91440" tIns="45720" rIns="91440" bIns="45720" rtlCol="0" anchor="ctr"/>
+          <a:lstStyle/>
+          <a:p>
+            <a:pPr algn="ctr"/>
+            <a:r>
+              <a:rPr lang="en-US" sz="1400" dirty="0">
                 <a:latin typeface="Arial"/>
                 <a:cs typeface="Arial"/>
               </a:rPr>
@@ -4032,11 +4091,11 @@
           <a:p>
             <a:pPr algn="ctr"/>
             <a:r>
-              <a:rPr lang="en-US" sz="1400">
+              <a:rPr lang="en-US" sz="1400" dirty="0">
                 <a:latin typeface="Arial"/>
                 <a:cs typeface="Arial"/>
               </a:rPr>
-              <a:t>data</a:t>
+              <a:t>data (AD)</a:t>
             </a:r>
           </a:p>
         </p:txBody>
@@ -4049,7 +4108,7 @@
         </p:nvSpPr>
         <p:spPr>
           <a:xfrm>
-            <a:off x="3955574" y="1452856"/>
+            <a:off x="3152857" y="1458991"/>
             <a:ext cx="471245" cy="441714"/>
           </a:xfrm>
           <a:prstGeom prst="rect">
@@ -4085,7 +4144,7 @@
         </p:nvSpPr>
         <p:spPr>
           <a:xfrm>
-            <a:off x="8378819" y="1461331"/>
+            <a:off x="11477327" y="1461331"/>
             <a:ext cx="471245" cy="441714"/>
           </a:xfrm>
           <a:prstGeom prst="rect">
@@ -4101,7 +4160,7 @@
           <a:p>
             <a:pPr algn="ctr"/>
             <a:r>
-              <a:rPr lang="en-US" sz="2400" b="1">
+              <a:rPr lang="en-US" sz="2400" b="1" dirty="0">
                 <a:solidFill>
                   <a:schemeClr val="bg1"/>
                 </a:solidFill>
@@ -4121,7 +4180,7 @@
         </p:nvSpPr>
         <p:spPr>
           <a:xfrm>
-            <a:off x="8766945" y="1364514"/>
+            <a:off x="11865453" y="1364514"/>
             <a:ext cx="1044234" cy="773935"/>
           </a:xfrm>
           <a:prstGeom prst="rect">
@@ -4148,11 +4207,11 @@
           <a:p>
             <a:pPr algn="ctr"/>
             <a:r>
-              <a:rPr lang="en-US" sz="1400">
+              <a:rPr lang="en-US" sz="1400" dirty="0">
                 <a:latin typeface="Arial"/>
                 <a:cs typeface="Arial"/>
               </a:rPr>
-              <a:t>Geometry video data</a:t>
+              <a:t>Geometry video data (GVD)</a:t>
             </a:r>
           </a:p>
         </p:txBody>
@@ -4165,7 +4224,7 @@
         </p:nvSpPr>
         <p:spPr>
           <a:xfrm>
-            <a:off x="9833889" y="1356086"/>
+            <a:off x="12932397" y="1356086"/>
             <a:ext cx="1133787" cy="782358"/>
           </a:xfrm>
           <a:prstGeom prst="rect">
@@ -4192,11 +4251,11 @@
           <a:p>
             <a:pPr algn="ctr"/>
             <a:r>
-              <a:rPr lang="en-US" sz="1400">
+              <a:rPr lang="en-US" sz="1400" dirty="0">
                 <a:latin typeface="Arial"/>
                 <a:cs typeface="Arial"/>
               </a:rPr>
-              <a:t>Attribute video data</a:t>
+              <a:t>Attribute video data (AVD)</a:t>
             </a:r>
           </a:p>
         </p:txBody>
@@ -4209,13 +4268,13 @@
         </p:nvSpPr>
         <p:spPr>
           <a:xfrm rot="16200000">
-            <a:off x="2600044" y="136001"/>
-            <a:ext cx="208263" cy="4764064"/>
+            <a:off x="3689540" y="-705662"/>
+            <a:ext cx="208263" cy="6943057"/>
           </a:xfrm>
           <a:prstGeom prst="leftBrace">
             <a:avLst>
               <a:gd name="adj1" fmla="val 8333"/>
-              <a:gd name="adj2" fmla="val 77551"/>
+              <a:gd name="adj2" fmla="val 60873"/>
             </a:avLst>
           </a:prstGeom>
         </p:spPr>
@@ -4253,11 +4312,14 @@
         </p:nvSpPr>
         <p:spPr>
           <a:xfrm rot="16200000">
-            <a:off x="8567580" y="-862039"/>
-            <a:ext cx="222784" cy="6774661"/>
+            <a:off x="11668409" y="-1888256"/>
+            <a:ext cx="222784" cy="8886918"/>
           </a:xfrm>
           <a:prstGeom prst="leftBrace">
-            <a:avLst/>
+            <a:avLst>
+              <a:gd name="adj1" fmla="val 8333"/>
+              <a:gd name="adj2" fmla="val 68506"/>
+            </a:avLst>
           </a:prstGeom>
         </p:spPr>
         <p:style>
@@ -4286,60 +4348,18 @@
           </a:p>
         </p:txBody>
       </p:sp>
-      <p:sp>
-        <p:nvSpPr>
-          <p:cNvPr id="64" name="Rectangle 63"/>
-          <p:cNvSpPr/>
-          <p:nvPr/>
-        </p:nvSpPr>
-        <p:spPr>
-          <a:xfrm>
-            <a:off x="581080" y="4219858"/>
-            <a:ext cx="1914241" cy="445918"/>
-          </a:xfrm>
-          <a:prstGeom prst="rect">
-            <a:avLst/>
-          </a:prstGeom>
-        </p:spPr>
-        <p:style>
-          <a:lnRef idx="2">
-            <a:schemeClr val="dk1"/>
-          </a:lnRef>
-          <a:fillRef idx="1">
-            <a:schemeClr val="lt1"/>
-          </a:fillRef>
-          <a:effectRef idx="0">
-            <a:schemeClr val="dk1"/>
-          </a:effectRef>
-          <a:fontRef idx="minor">
-            <a:schemeClr val="dk1"/>
-          </a:fontRef>
-        </p:style>
-        <p:txBody>
-          <a:bodyPr lIns="91440" tIns="45720" rIns="91440" bIns="45720" rtlCol="0" anchor="ctr"/>
-          <a:lstStyle/>
-          <a:p>
-            <a:pPr algn="ctr"/>
-            <a:r>
-              <a:rPr lang="en-US" sz="1400">
-                <a:latin typeface="Arial"/>
-                <a:cs typeface="Arial"/>
-              </a:rPr>
-              <a:t>View parameters list</a:t>
-            </a:r>
-          </a:p>
-        </p:txBody>
-      </p:sp>
       <p:cxnSp>
         <p:nvCxnSpPr>
           <p:cNvPr id="66" name="Straight Connector 65"/>
-          <p:cNvCxnSpPr/>
+          <p:cNvCxnSpPr>
+            <a:cxnSpLocks/>
+          </p:cNvCxnSpPr>
           <p:nvPr/>
         </p:nvCxnSpPr>
         <p:spPr>
           <a:xfrm flipH="1">
-            <a:off x="123171" y="1418167"/>
-            <a:ext cx="1767298" cy="1839053"/>
+            <a:off x="123171" y="1364513"/>
+            <a:ext cx="1327386" cy="1892707"/>
           </a:xfrm>
           <a:prstGeom prst="line">
             <a:avLst/>
@@ -4379,8 +4399,8 @@
         </p:nvCxnSpPr>
         <p:spPr>
           <a:xfrm>
-            <a:off x="2846565" y="1372941"/>
-            <a:ext cx="106667" cy="1884279"/>
+            <a:off x="2440927" y="1364513"/>
+            <a:ext cx="512305" cy="1892707"/>
           </a:xfrm>
           <a:prstGeom prst="line">
             <a:avLst/>
@@ -4418,8 +4438,8 @@
         </p:nvSpPr>
         <p:spPr>
           <a:xfrm>
-            <a:off x="4637702" y="3703139"/>
-            <a:ext cx="836204" cy="1009507"/>
+            <a:off x="5975429" y="3703139"/>
+            <a:ext cx="1034882" cy="1009507"/>
           </a:xfrm>
           <a:prstGeom prst="rect">
             <a:avLst/>
@@ -4445,24 +4465,589 @@
           <a:p>
             <a:pPr algn="ctr"/>
             <a:r>
-              <a:rPr lang="en-US" sz="1400">
+              <a:rPr lang="en-US" sz="1400" dirty="0">
                 <a:latin typeface="Arial"/>
                 <a:cs typeface="Arial"/>
               </a:rPr>
-              <a:t>Atlas frame param. set</a:t>
-            </a:r>
-          </a:p>
-        </p:txBody>
-      </p:sp>
-      <p:sp>
-        <p:nvSpPr>
-          <p:cNvPr id="71" name="TextBox 70"/>
+              <a:t>Atlas frame param. set (AFPS)</a:t>
+            </a:r>
+          </a:p>
+        </p:txBody>
+      </p:sp>
+      <p:sp>
+        <p:nvSpPr>
+          <p:cNvPr id="73" name="Left Brace 72"/>
+          <p:cNvSpPr/>
+          <p:nvPr/>
+        </p:nvSpPr>
+        <p:spPr>
+          <a:xfrm rot="16200000">
+            <a:off x="2792703" y="1017243"/>
+            <a:ext cx="148639" cy="2832931"/>
+          </a:xfrm>
+          <a:prstGeom prst="leftBrace">
+            <a:avLst/>
+          </a:prstGeom>
+        </p:spPr>
+        <p:style>
+          <a:lnRef idx="2">
+            <a:schemeClr val="dk1"/>
+          </a:lnRef>
+          <a:fillRef idx="0">
+            <a:schemeClr val="dk1"/>
+          </a:fillRef>
+          <a:effectRef idx="1">
+            <a:schemeClr val="dk1"/>
+          </a:effectRef>
+          <a:fontRef idx="minor">
+            <a:schemeClr val="tx1"/>
+          </a:fontRef>
+        </p:style>
+        <p:txBody>
+          <a:bodyPr rtlCol="0" anchor="ctr"/>
+          <a:lstStyle/>
+          <a:p>
+            <a:pPr algn="ctr"/>
+            <a:endParaRPr lang="en-US">
+              <a:latin typeface="Arial"/>
+              <a:cs typeface="Arial"/>
+            </a:endParaRPr>
+          </a:p>
+        </p:txBody>
+      </p:sp>
+      <p:sp>
+        <p:nvSpPr>
+          <p:cNvPr id="74" name="TextBox 73"/>
           <p:cNvSpPr txBox="1"/>
           <p:nvPr/>
         </p:nvSpPr>
         <p:spPr>
           <a:xfrm>
-            <a:off x="9723215" y="3970210"/>
+            <a:off x="2186473" y="2444864"/>
+            <a:ext cx="1533518" cy="369332"/>
+          </a:xfrm>
+          <a:prstGeom prst="rect">
+            <a:avLst/>
+          </a:prstGeom>
+          <a:noFill/>
+        </p:spPr>
+        <p:txBody>
+          <a:bodyPr wrap="square" rtlCol="0">
+            <a:spAutoFit/>
+          </a:bodyPr>
+          <a:lstStyle/>
+          <a:p>
+            <a:r>
+              <a:rPr lang="en-US" dirty="0">
+                <a:latin typeface="Arial"/>
+                <a:cs typeface="Arial"/>
+              </a:rPr>
+              <a:t>Intra period</a:t>
+            </a:r>
+          </a:p>
+        </p:txBody>
+      </p:sp>
+      <p:cxnSp>
+        <p:nvCxnSpPr>
+          <p:cNvPr id="88" name="Straight Connector 87"/>
+          <p:cNvCxnSpPr>
+            <a:cxnSpLocks/>
+          </p:cNvCxnSpPr>
+          <p:nvPr/>
+        </p:nvCxnSpPr>
+        <p:spPr>
+          <a:xfrm>
+            <a:off x="2517154" y="1364512"/>
+            <a:ext cx="2164706" cy="1891779"/>
+          </a:xfrm>
+          <a:prstGeom prst="line">
+            <a:avLst/>
+          </a:prstGeom>
+          <a:ln w="9525" cap="flat" cmpd="sng" algn="ctr">
+            <a:solidFill>
+              <a:schemeClr val="dk1"/>
+            </a:solidFill>
+            <a:prstDash val="dash"/>
+            <a:round/>
+            <a:headEnd type="none" w="med" len="med"/>
+            <a:tailEnd type="none" w="med" len="med"/>
+          </a:ln>
+        </p:spPr>
+        <p:style>
+          <a:lnRef idx="0">
+            <a:scrgbClr r="0" g="0" b="0"/>
+          </a:lnRef>
+          <a:fillRef idx="0">
+            <a:scrgbClr r="0" g="0" b="0"/>
+          </a:fillRef>
+          <a:effectRef idx="0">
+            <a:scrgbClr r="0" g="0" b="0"/>
+          </a:effectRef>
+          <a:fontRef idx="minor">
+            <a:schemeClr val="tx1"/>
+          </a:fontRef>
+        </p:style>
+      </p:cxnSp>
+      <p:sp>
+        <p:nvSpPr>
+          <p:cNvPr id="37" name="Rectangle 36">
+            <a:extLst>
+              <a:ext uri="{FF2B5EF4-FFF2-40B4-BE49-F238E27FC236}">
+                <a16:creationId xmlns:a16="http://schemas.microsoft.com/office/drawing/2014/main" id="{D0E482D7-0410-45FD-A83F-0225FC138F75}"/>
+              </a:ext>
+            </a:extLst>
+          </p:cNvPr>
+          <p:cNvSpPr/>
+          <p:nvPr/>
+        </p:nvSpPr>
+        <p:spPr>
+          <a:xfrm>
+            <a:off x="9454206" y="1364514"/>
+            <a:ext cx="1044233" cy="782358"/>
+          </a:xfrm>
+          <a:prstGeom prst="rect">
+            <a:avLst/>
+          </a:prstGeom>
+          <a:ln>
+            <a:prstDash val="solid"/>
+          </a:ln>
+        </p:spPr>
+        <p:style>
+          <a:lnRef idx="2">
+            <a:schemeClr val="dk1"/>
+          </a:lnRef>
+          <a:fillRef idx="1">
+            <a:schemeClr val="lt1"/>
+          </a:fillRef>
+          <a:effectRef idx="0">
+            <a:schemeClr val="dk1"/>
+          </a:effectRef>
+          <a:fontRef idx="minor">
+            <a:schemeClr val="dk1"/>
+          </a:fontRef>
+        </p:style>
+        <p:txBody>
+          <a:bodyPr lIns="91440" tIns="45720" rIns="91440" bIns="45720" rtlCol="0" anchor="ctr"/>
+          <a:lstStyle/>
+          <a:p>
+            <a:pPr algn="ctr"/>
+            <a:r>
+              <a:rPr lang="en-US" sz="1300" dirty="0">
+                <a:latin typeface="Arial"/>
+                <a:cs typeface="Arial"/>
+              </a:rPr>
+              <a:t>Occupancy video data (OVD)</a:t>
+            </a:r>
+          </a:p>
+        </p:txBody>
+      </p:sp>
+      <p:sp>
+        <p:nvSpPr>
+          <p:cNvPr id="38" name="Rectangle 37">
+            <a:extLst>
+              <a:ext uri="{FF2B5EF4-FFF2-40B4-BE49-F238E27FC236}">
+                <a16:creationId xmlns:a16="http://schemas.microsoft.com/office/drawing/2014/main" id="{C60CCC2A-C0ED-42F1-B1EA-A1045AB59AB3}"/>
+              </a:ext>
+            </a:extLst>
+          </p:cNvPr>
+          <p:cNvSpPr/>
+          <p:nvPr/>
+        </p:nvSpPr>
+        <p:spPr>
+          <a:xfrm>
+            <a:off x="14088895" y="1356086"/>
+            <a:ext cx="1044233" cy="782358"/>
+          </a:xfrm>
+          <a:prstGeom prst="rect">
+            <a:avLst/>
+          </a:prstGeom>
+          <a:ln>
+            <a:prstDash val="solid"/>
+          </a:ln>
+        </p:spPr>
+        <p:style>
+          <a:lnRef idx="2">
+            <a:schemeClr val="dk1"/>
+          </a:lnRef>
+          <a:fillRef idx="1">
+            <a:schemeClr val="lt1"/>
+          </a:fillRef>
+          <a:effectRef idx="0">
+            <a:schemeClr val="dk1"/>
+          </a:effectRef>
+          <a:fontRef idx="minor">
+            <a:schemeClr val="dk1"/>
+          </a:fontRef>
+        </p:style>
+        <p:txBody>
+          <a:bodyPr lIns="91440" tIns="45720" rIns="91440" bIns="45720" rtlCol="0" anchor="ctr"/>
+          <a:lstStyle/>
+          <a:p>
+            <a:pPr algn="ctr"/>
+            <a:r>
+              <a:rPr lang="en-US" sz="1300" dirty="0">
+                <a:latin typeface="Arial"/>
+                <a:cs typeface="Arial"/>
+              </a:rPr>
+              <a:t>Occupancy video data (OVD)</a:t>
+            </a:r>
+          </a:p>
+        </p:txBody>
+      </p:sp>
+      <p:sp>
+        <p:nvSpPr>
+          <p:cNvPr id="39" name="Rectangle 38">
+            <a:extLst>
+              <a:ext uri="{FF2B5EF4-FFF2-40B4-BE49-F238E27FC236}">
+                <a16:creationId xmlns:a16="http://schemas.microsoft.com/office/drawing/2014/main" id="{7075E023-3EB2-4024-AE65-FA343DE7D895}"/>
+              </a:ext>
+            </a:extLst>
+          </p:cNvPr>
+          <p:cNvSpPr/>
+          <p:nvPr/>
+        </p:nvSpPr>
+        <p:spPr>
+          <a:xfrm>
+            <a:off x="15153625" y="1356086"/>
+            <a:ext cx="1044233" cy="782358"/>
+          </a:xfrm>
+          <a:prstGeom prst="rect">
+            <a:avLst/>
+          </a:prstGeom>
+          <a:ln>
+            <a:prstDash val="solid"/>
+          </a:ln>
+        </p:spPr>
+        <p:style>
+          <a:lnRef idx="2">
+            <a:schemeClr val="dk1"/>
+          </a:lnRef>
+          <a:fillRef idx="1">
+            <a:schemeClr val="lt1"/>
+          </a:fillRef>
+          <a:effectRef idx="0">
+            <a:schemeClr val="dk1"/>
+          </a:effectRef>
+          <a:fontRef idx="minor">
+            <a:schemeClr val="dk1"/>
+          </a:fontRef>
+        </p:style>
+        <p:txBody>
+          <a:bodyPr lIns="91440" tIns="45720" rIns="91440" bIns="45720" rtlCol="0" anchor="ctr"/>
+          <a:lstStyle/>
+          <a:p>
+            <a:pPr algn="ctr"/>
+            <a:r>
+              <a:rPr lang="en-US" sz="1300" dirty="0">
+                <a:latin typeface="Arial"/>
+                <a:cs typeface="Arial"/>
+              </a:rPr>
+              <a:t>Packed video data (PVD)</a:t>
+            </a:r>
+          </a:p>
+        </p:txBody>
+      </p:sp>
+      <p:sp>
+        <p:nvSpPr>
+          <p:cNvPr id="40" name="Rectangle 39">
+            <a:extLst>
+              <a:ext uri="{FF2B5EF4-FFF2-40B4-BE49-F238E27FC236}">
+                <a16:creationId xmlns:a16="http://schemas.microsoft.com/office/drawing/2014/main" id="{8AB9EE09-79EA-457E-AAD7-2576A90BC6E7}"/>
+              </a:ext>
+            </a:extLst>
+          </p:cNvPr>
+          <p:cNvSpPr/>
+          <p:nvPr/>
+        </p:nvSpPr>
+        <p:spPr>
+          <a:xfrm>
+            <a:off x="10518936" y="1364514"/>
+            <a:ext cx="1044233" cy="782358"/>
+          </a:xfrm>
+          <a:prstGeom prst="rect">
+            <a:avLst/>
+          </a:prstGeom>
+          <a:ln>
+            <a:prstDash val="solid"/>
+          </a:ln>
+        </p:spPr>
+        <p:style>
+          <a:lnRef idx="2">
+            <a:schemeClr val="dk1"/>
+          </a:lnRef>
+          <a:fillRef idx="1">
+            <a:schemeClr val="lt1"/>
+          </a:fillRef>
+          <a:effectRef idx="0">
+            <a:schemeClr val="dk1"/>
+          </a:effectRef>
+          <a:fontRef idx="minor">
+            <a:schemeClr val="dk1"/>
+          </a:fontRef>
+        </p:style>
+        <p:txBody>
+          <a:bodyPr lIns="91440" tIns="45720" rIns="91440" bIns="45720" rtlCol="0" anchor="ctr"/>
+          <a:lstStyle/>
+          <a:p>
+            <a:pPr algn="ctr"/>
+            <a:r>
+              <a:rPr lang="en-US" sz="1300" dirty="0">
+                <a:latin typeface="Arial"/>
+                <a:cs typeface="Arial"/>
+              </a:rPr>
+              <a:t>Packed video data (PVD)</a:t>
+            </a:r>
+          </a:p>
+        </p:txBody>
+      </p:sp>
+      <p:sp>
+        <p:nvSpPr>
+          <p:cNvPr id="49" name="Rectangle 48">
+            <a:extLst>
+              <a:ext uri="{FF2B5EF4-FFF2-40B4-BE49-F238E27FC236}">
+                <a16:creationId xmlns:a16="http://schemas.microsoft.com/office/drawing/2014/main" id="{1D504FE4-751D-455D-967E-4CFA9A05BBD1}"/>
+              </a:ext>
+            </a:extLst>
+          </p:cNvPr>
+          <p:cNvSpPr/>
+          <p:nvPr/>
+        </p:nvSpPr>
+        <p:spPr>
+          <a:xfrm>
+            <a:off x="2211708" y="3703139"/>
+            <a:ext cx="2092194" cy="1009507"/>
+          </a:xfrm>
+          <a:prstGeom prst="rect">
+            <a:avLst/>
+          </a:prstGeom>
+        </p:spPr>
+        <p:style>
+          <a:lnRef idx="2">
+            <a:schemeClr val="dk1"/>
+          </a:lnRef>
+          <a:fillRef idx="1">
+            <a:schemeClr val="lt1"/>
+          </a:fillRef>
+          <a:effectRef idx="0">
+            <a:schemeClr val="dk1"/>
+          </a:effectRef>
+          <a:fontRef idx="minor">
+            <a:schemeClr val="dk1"/>
+          </a:fontRef>
+        </p:style>
+        <p:txBody>
+          <a:bodyPr rtlCol="0" anchor="t"/>
+          <a:lstStyle/>
+          <a:p>
+            <a:pPr algn="ctr"/>
+            <a:r>
+              <a:rPr lang="en-US" sz="1400" dirty="0">
+                <a:latin typeface="Arial"/>
+                <a:cs typeface="Arial"/>
+              </a:rPr>
+              <a:t>Common atlas frame (IDR_CAF)</a:t>
+            </a:r>
+          </a:p>
+        </p:txBody>
+      </p:sp>
+      <p:sp>
+        <p:nvSpPr>
+          <p:cNvPr id="51" name="Rectangle 50">
+            <a:extLst>
+              <a:ext uri="{FF2B5EF4-FFF2-40B4-BE49-F238E27FC236}">
+                <a16:creationId xmlns:a16="http://schemas.microsoft.com/office/drawing/2014/main" id="{2CEE6F00-A3E5-4A86-B940-8081C4E26254}"/>
+              </a:ext>
+            </a:extLst>
+          </p:cNvPr>
+          <p:cNvSpPr/>
+          <p:nvPr/>
+        </p:nvSpPr>
+        <p:spPr>
+          <a:xfrm>
+            <a:off x="4433510" y="1360922"/>
+            <a:ext cx="1011337" cy="782366"/>
+          </a:xfrm>
+          <a:prstGeom prst="rect">
+            <a:avLst/>
+          </a:prstGeom>
+        </p:spPr>
+        <p:style>
+          <a:lnRef idx="2">
+            <a:schemeClr val="dk1"/>
+          </a:lnRef>
+          <a:fillRef idx="1">
+            <a:schemeClr val="lt1"/>
+          </a:fillRef>
+          <a:effectRef idx="0">
+            <a:schemeClr val="dk1"/>
+          </a:effectRef>
+          <a:fontRef idx="minor">
+            <a:schemeClr val="dk1"/>
+          </a:fontRef>
+        </p:style>
+        <p:txBody>
+          <a:bodyPr lIns="91440" tIns="45720" rIns="91440" bIns="45720" rtlCol="0" anchor="ctr"/>
+          <a:lstStyle/>
+          <a:p>
+            <a:pPr algn="ctr"/>
+            <a:r>
+              <a:rPr lang="en-US" sz="1400" dirty="0">
+                <a:latin typeface="Arial"/>
+                <a:cs typeface="Arial"/>
+              </a:rPr>
+              <a:t>Common</a:t>
+            </a:r>
+            <a:br>
+              <a:rPr lang="en-US" sz="1400" dirty="0">
+                <a:latin typeface="Arial"/>
+                <a:cs typeface="Arial"/>
+              </a:rPr>
+            </a:br>
+            <a:r>
+              <a:rPr lang="en-US" sz="1400" dirty="0">
+                <a:latin typeface="Arial"/>
+                <a:cs typeface="Arial"/>
+              </a:rPr>
+              <a:t>atlas data (CAD)</a:t>
+            </a:r>
+          </a:p>
+        </p:txBody>
+      </p:sp>
+      <p:sp>
+        <p:nvSpPr>
+          <p:cNvPr id="52" name="Rectangle 51">
+            <a:extLst>
+              <a:ext uri="{FF2B5EF4-FFF2-40B4-BE49-F238E27FC236}">
+                <a16:creationId xmlns:a16="http://schemas.microsoft.com/office/drawing/2014/main" id="{83C10EB0-3F18-4B2B-A6BD-9B9DD1C7DEDA}"/>
+              </a:ext>
+            </a:extLst>
+          </p:cNvPr>
+          <p:cNvSpPr/>
+          <p:nvPr/>
+        </p:nvSpPr>
+        <p:spPr>
+          <a:xfrm>
+            <a:off x="5486575" y="1372940"/>
+            <a:ext cx="662347" cy="782358"/>
+          </a:xfrm>
+          <a:prstGeom prst="rect">
+            <a:avLst/>
+          </a:prstGeom>
+        </p:spPr>
+        <p:style>
+          <a:lnRef idx="2">
+            <a:schemeClr val="dk1"/>
+          </a:lnRef>
+          <a:fillRef idx="1">
+            <a:schemeClr val="lt1"/>
+          </a:fillRef>
+          <a:effectRef idx="0">
+            <a:schemeClr val="dk1"/>
+          </a:effectRef>
+          <a:fontRef idx="minor">
+            <a:schemeClr val="dk1"/>
+          </a:fontRef>
+        </p:style>
+        <p:txBody>
+          <a:bodyPr lIns="91440" tIns="45720" rIns="91440" bIns="45720" rtlCol="0" anchor="ctr"/>
+          <a:lstStyle/>
+          <a:p>
+            <a:pPr algn="ctr"/>
+            <a:r>
+              <a:rPr lang="en-US" sz="1400" dirty="0">
+                <a:latin typeface="Arial"/>
+                <a:cs typeface="Arial"/>
+              </a:rPr>
+              <a:t>Atlas</a:t>
+            </a:r>
+          </a:p>
+          <a:p>
+            <a:pPr algn="ctr"/>
+            <a:r>
+              <a:rPr lang="en-US" sz="1400" dirty="0">
+                <a:latin typeface="Arial"/>
+                <a:cs typeface="Arial"/>
+              </a:rPr>
+              <a:t>data (AD)</a:t>
+            </a:r>
+          </a:p>
+        </p:txBody>
+      </p:sp>
+      <p:sp>
+        <p:nvSpPr>
+          <p:cNvPr id="54" name="Rectangle 53">
+            <a:extLst>
+              <a:ext uri="{FF2B5EF4-FFF2-40B4-BE49-F238E27FC236}">
+                <a16:creationId xmlns:a16="http://schemas.microsoft.com/office/drawing/2014/main" id="{3A999BDB-7C93-4E9E-9ECF-EDF281C7046D}"/>
+              </a:ext>
+            </a:extLst>
+          </p:cNvPr>
+          <p:cNvSpPr/>
+          <p:nvPr/>
+        </p:nvSpPr>
+        <p:spPr>
+          <a:xfrm>
+            <a:off x="6597252" y="1372933"/>
+            <a:ext cx="667947" cy="782358"/>
+          </a:xfrm>
+          <a:prstGeom prst="rect">
+            <a:avLst/>
+          </a:prstGeom>
+        </p:spPr>
+        <p:style>
+          <a:lnRef idx="2">
+            <a:schemeClr val="dk1"/>
+          </a:lnRef>
+          <a:fillRef idx="1">
+            <a:schemeClr val="lt1"/>
+          </a:fillRef>
+          <a:effectRef idx="0">
+            <a:schemeClr val="dk1"/>
+          </a:effectRef>
+          <a:fontRef idx="minor">
+            <a:schemeClr val="dk1"/>
+          </a:fontRef>
+        </p:style>
+        <p:txBody>
+          <a:bodyPr lIns="91440" tIns="45720" rIns="91440" bIns="45720" rtlCol="0" anchor="ctr"/>
+          <a:lstStyle/>
+          <a:p>
+            <a:pPr algn="ctr"/>
+            <a:r>
+              <a:rPr lang="en-US" sz="1400" dirty="0">
+                <a:latin typeface="Arial"/>
+                <a:cs typeface="Arial"/>
+              </a:rPr>
+              <a:t>Atlas</a:t>
+            </a:r>
+          </a:p>
+          <a:p>
+            <a:pPr algn="ctr"/>
+            <a:r>
+              <a:rPr lang="en-US" sz="1400" dirty="0">
+                <a:latin typeface="Arial"/>
+                <a:cs typeface="Arial"/>
+              </a:rPr>
+              <a:t>data (AD)</a:t>
+            </a:r>
+          </a:p>
+        </p:txBody>
+      </p:sp>
+      <p:sp>
+        <p:nvSpPr>
+          <p:cNvPr id="55" name="TextBox 54">
+            <a:extLst>
+              <a:ext uri="{FF2B5EF4-FFF2-40B4-BE49-F238E27FC236}">
+                <a16:creationId xmlns:a16="http://schemas.microsoft.com/office/drawing/2014/main" id="{5AB6C2B8-7335-41C7-BB0B-FEC1BC375F63}"/>
+              </a:ext>
+            </a:extLst>
+          </p:cNvPr>
+          <p:cNvSpPr txBox="1"/>
+          <p:nvPr/>
+        </p:nvSpPr>
+        <p:spPr>
+          <a:xfrm>
+            <a:off x="6134568" y="1461275"/>
             <a:ext cx="471245" cy="441714"/>
           </a:xfrm>
           <a:prstGeom prst="rect">
@@ -4492,14 +5077,20 @@
       </p:sp>
       <p:sp>
         <p:nvSpPr>
-          <p:cNvPr id="73" name="Left Brace 72"/>
+          <p:cNvPr id="56" name="Left Brace 55">
+            <a:extLst>
+              <a:ext uri="{FF2B5EF4-FFF2-40B4-BE49-F238E27FC236}">
+                <a16:creationId xmlns:a16="http://schemas.microsoft.com/office/drawing/2014/main" id="{ABC119CE-1994-4745-92B8-5661AF3C4E3A}"/>
+              </a:ext>
+            </a:extLst>
+          </p:cNvPr>
           <p:cNvSpPr/>
           <p:nvPr/>
         </p:nvSpPr>
         <p:spPr>
           <a:xfrm rot="16200000">
-            <a:off x="6525528" y="4236278"/>
-            <a:ext cx="214333" cy="1869439"/>
+            <a:off x="5777842" y="1015819"/>
+            <a:ext cx="148639" cy="2832931"/>
           </a:xfrm>
           <a:prstGeom prst="leftBrace">
             <a:avLst/>
@@ -4533,14 +5124,20 @@
       </p:sp>
       <p:sp>
         <p:nvSpPr>
-          <p:cNvPr id="74" name="TextBox 73"/>
+          <p:cNvPr id="57" name="TextBox 56">
+            <a:extLst>
+              <a:ext uri="{FF2B5EF4-FFF2-40B4-BE49-F238E27FC236}">
+                <a16:creationId xmlns:a16="http://schemas.microsoft.com/office/drawing/2014/main" id="{8D6174AB-18D8-4F53-9C1A-86DD73624454}"/>
+              </a:ext>
+            </a:extLst>
+          </p:cNvPr>
           <p:cNvSpPr txBox="1"/>
           <p:nvPr/>
         </p:nvSpPr>
         <p:spPr>
           <a:xfrm>
-            <a:off x="6059579" y="5278164"/>
-            <a:ext cx="1293467" cy="353371"/>
+            <a:off x="5171612" y="2443440"/>
+            <a:ext cx="1533518" cy="369332"/>
           </a:xfrm>
           <a:prstGeom prst="rect">
             <a:avLst/>
@@ -4548,13 +5145,13 @@
           <a:noFill/>
         </p:spPr>
         <p:txBody>
-          <a:bodyPr wrap="none" rtlCol="0">
+          <a:bodyPr wrap="square" rtlCol="0">
             <a:spAutoFit/>
           </a:bodyPr>
           <a:lstStyle/>
           <a:p>
             <a:r>
-              <a:rPr lang="en-US">
+              <a:rPr lang="en-US" dirty="0">
                 <a:latin typeface="Arial"/>
                 <a:cs typeface="Arial"/>
               </a:rPr>
@@ -4565,14 +5162,124 @@
       </p:sp>
       <p:sp>
         <p:nvSpPr>
-          <p:cNvPr id="75" name="Rectangle 74"/>
+          <p:cNvPr id="65" name="Rectangle 64">
+            <a:extLst>
+              <a:ext uri="{FF2B5EF4-FFF2-40B4-BE49-F238E27FC236}">
+                <a16:creationId xmlns:a16="http://schemas.microsoft.com/office/drawing/2014/main" id="{0177D0F4-79D9-42E0-A41D-1CA7A6127A78}"/>
+              </a:ext>
+            </a:extLst>
+          </p:cNvPr>
           <p:cNvSpPr/>
           <p:nvPr/>
         </p:nvSpPr>
         <p:spPr>
           <a:xfrm>
-            <a:off x="7786319" y="3703139"/>
-            <a:ext cx="921965" cy="1009507"/>
+            <a:off x="9125915" y="3257221"/>
+            <a:ext cx="1846873" cy="1690971"/>
+          </a:xfrm>
+          <a:prstGeom prst="rect">
+            <a:avLst/>
+          </a:prstGeom>
+        </p:spPr>
+        <p:style>
+          <a:lnRef idx="2">
+            <a:schemeClr val="accent1">
+              <a:shade val="50000"/>
+            </a:schemeClr>
+          </a:lnRef>
+          <a:fillRef idx="1">
+            <a:schemeClr val="accent1"/>
+          </a:fillRef>
+          <a:effectRef idx="0">
+            <a:schemeClr val="accent1"/>
+          </a:effectRef>
+          <a:fontRef idx="minor">
+            <a:schemeClr val="lt1"/>
+          </a:fontRef>
+        </p:style>
+        <p:txBody>
+          <a:bodyPr lIns="91440" tIns="45720" rIns="91440" bIns="45720" rtlCol="0" anchor="t"/>
+          <a:lstStyle/>
+          <a:p>
+            <a:pPr algn="ctr"/>
+            <a:r>
+              <a:rPr lang="en-US" sz="1600" u="sng" dirty="0">
+                <a:latin typeface="Arial"/>
+                <a:cs typeface="Arial"/>
+              </a:rPr>
+              <a:t>Common atlas data (CAD)</a:t>
+            </a:r>
+          </a:p>
+        </p:txBody>
+      </p:sp>
+      <p:sp>
+        <p:nvSpPr>
+          <p:cNvPr id="68" name="Rectangle 67">
+            <a:extLst>
+              <a:ext uri="{FF2B5EF4-FFF2-40B4-BE49-F238E27FC236}">
+                <a16:creationId xmlns:a16="http://schemas.microsoft.com/office/drawing/2014/main" id="{BA85A28F-8559-4E7B-82E6-4B8C03B4B5A5}"/>
+              </a:ext>
+            </a:extLst>
+          </p:cNvPr>
+          <p:cNvSpPr/>
+          <p:nvPr/>
+        </p:nvSpPr>
+        <p:spPr>
+          <a:xfrm>
+            <a:off x="11177904" y="3257221"/>
+            <a:ext cx="1846873" cy="1690971"/>
+          </a:xfrm>
+          <a:prstGeom prst="rect">
+            <a:avLst/>
+          </a:prstGeom>
+        </p:spPr>
+        <p:style>
+          <a:lnRef idx="2">
+            <a:schemeClr val="accent1">
+              <a:shade val="50000"/>
+            </a:schemeClr>
+          </a:lnRef>
+          <a:fillRef idx="1">
+            <a:schemeClr val="accent1"/>
+          </a:fillRef>
+          <a:effectRef idx="0">
+            <a:schemeClr val="accent1"/>
+          </a:effectRef>
+          <a:fontRef idx="minor">
+            <a:schemeClr val="lt1"/>
+          </a:fontRef>
+        </p:style>
+        <p:txBody>
+          <a:bodyPr rtlCol="0" anchor="t"/>
+          <a:lstStyle/>
+          <a:p>
+            <a:pPr algn="ctr"/>
+            <a:r>
+              <a:rPr lang="en-US" sz="1600" u="sng" dirty="0">
+                <a:latin typeface="Arial"/>
+                <a:cs typeface="Arial"/>
+              </a:rPr>
+              <a:t>Atlas data (AD)</a:t>
+            </a:r>
+          </a:p>
+        </p:txBody>
+      </p:sp>
+      <p:sp>
+        <p:nvSpPr>
+          <p:cNvPr id="69" name="Rectangle 68">
+            <a:extLst>
+              <a:ext uri="{FF2B5EF4-FFF2-40B4-BE49-F238E27FC236}">
+                <a16:creationId xmlns:a16="http://schemas.microsoft.com/office/drawing/2014/main" id="{89D56DE6-6E9B-4CC4-A9E3-641CF165EE14}"/>
+              </a:ext>
+            </a:extLst>
+          </p:cNvPr>
+          <p:cNvSpPr/>
+          <p:nvPr/>
+        </p:nvSpPr>
+        <p:spPr>
+          <a:xfrm>
+            <a:off x="11514895" y="3752790"/>
+            <a:ext cx="1155243" cy="1009507"/>
           </a:xfrm>
           <a:prstGeom prst="rect">
             <a:avLst/>
@@ -4598,98 +5305,41 @@
           <a:p>
             <a:pPr algn="ctr"/>
             <a:r>
-              <a:rPr lang="en-US" sz="1400">
+              <a:rPr lang="en-US" sz="1400" dirty="0">
                 <a:latin typeface="Arial"/>
                 <a:cs typeface="Arial"/>
               </a:rPr>
               <a:t>Atlas tile layer (patches)</a:t>
             </a:r>
           </a:p>
-        </p:txBody>
-      </p:sp>
-      <p:sp>
-        <p:nvSpPr>
-          <p:cNvPr id="77" name="Left Brace 76"/>
-          <p:cNvSpPr/>
-          <p:nvPr/>
-        </p:nvSpPr>
-        <p:spPr>
-          <a:xfrm rot="16200000">
-            <a:off x="8612161" y="4237990"/>
-            <a:ext cx="214333" cy="1866013"/>
-          </a:xfrm>
-          <a:prstGeom prst="leftBrace">
-            <a:avLst/>
-          </a:prstGeom>
-        </p:spPr>
-        <p:style>
-          <a:lnRef idx="2">
-            <a:schemeClr val="dk1"/>
-          </a:lnRef>
-          <a:fillRef idx="0">
-            <a:schemeClr val="dk1"/>
-          </a:fillRef>
-          <a:effectRef idx="1">
-            <a:schemeClr val="dk1"/>
-          </a:effectRef>
-          <a:fontRef idx="minor">
-            <a:schemeClr val="tx1"/>
-          </a:fontRef>
-        </p:style>
-        <p:txBody>
-          <a:bodyPr rtlCol="0" anchor="ctr"/>
-          <a:lstStyle/>
           <a:p>
             <a:pPr algn="ctr"/>
-            <a:endParaRPr lang="en-US">
-              <a:latin typeface="Arial"/>
-              <a:cs typeface="Arial"/>
-            </a:endParaRPr>
-          </a:p>
-        </p:txBody>
-      </p:sp>
-      <p:sp>
-        <p:nvSpPr>
-          <p:cNvPr id="78" name="TextBox 77"/>
-          <p:cNvSpPr txBox="1"/>
-          <p:nvPr/>
-        </p:nvSpPr>
-        <p:spPr>
-          <a:xfrm>
-            <a:off x="8101188" y="5278164"/>
-            <a:ext cx="1293467" cy="353371"/>
-          </a:xfrm>
-          <a:prstGeom prst="rect">
-            <a:avLst/>
-          </a:prstGeom>
-          <a:noFill/>
-        </p:spPr>
-        <p:txBody>
-          <a:bodyPr wrap="none" rtlCol="0">
-            <a:spAutoFit/>
-          </a:bodyPr>
-          <a:lstStyle/>
-          <a:p>
-            <a:r>
-              <a:rPr lang="en-US">
+            <a:r>
+              <a:rPr lang="en-US" sz="1400" dirty="0">
                 <a:latin typeface="Arial"/>
                 <a:cs typeface="Arial"/>
               </a:rPr>
-              <a:t>Intra period</a:t>
-            </a:r>
-          </a:p>
-        </p:txBody>
-      </p:sp>
-      <p:sp>
-        <p:nvSpPr>
-          <p:cNvPr id="80" name="Rectangle 79"/>
+              <a:t>(CRA)</a:t>
+            </a:r>
+          </a:p>
+        </p:txBody>
+      </p:sp>
+      <p:sp>
+        <p:nvSpPr>
+          <p:cNvPr id="72" name="Rectangle 71">
+            <a:extLst>
+              <a:ext uri="{FF2B5EF4-FFF2-40B4-BE49-F238E27FC236}">
+                <a16:creationId xmlns:a16="http://schemas.microsoft.com/office/drawing/2014/main" id="{DCB9F9ED-FDC8-43B7-B97C-6B5DA6EE269E}"/>
+              </a:ext>
+            </a:extLst>
+          </p:cNvPr>
           <p:cNvSpPr/>
           <p:nvPr/>
         </p:nvSpPr>
         <p:spPr>
           <a:xfrm>
-            <a:off x="10209744" y="3686313"/>
-            <a:ext cx="913307" cy="1009507"/>
+            <a:off x="9317087" y="3752790"/>
+            <a:ext cx="1464527" cy="1009507"/>
           </a:xfrm>
           <a:prstGeom prst="rect">
             <a:avLst/>
@@ -4710,103 +5360,32 @@
           </a:fontRef>
         </p:style>
         <p:txBody>
-          <a:bodyPr lIns="91440" tIns="45720" rIns="91440" bIns="45720" rtlCol="0" anchor="ctr"/>
+          <a:bodyPr rtlCol="0" anchor="ctr"/>
           <a:lstStyle/>
           <a:p>
             <a:pPr algn="ctr"/>
             <a:r>
-              <a:rPr lang="en-US" sz="1300">
+              <a:rPr lang="en-US" sz="1400" dirty="0">
                 <a:latin typeface="Arial"/>
                 <a:cs typeface="Arial"/>
               </a:rPr>
-              <a:t>Atlas tile layer (patches)</a:t>
-            </a:r>
-          </a:p>
-        </p:txBody>
-      </p:sp>
-      <p:sp>
-        <p:nvSpPr>
-          <p:cNvPr id="81" name="TextBox 80"/>
-          <p:cNvSpPr txBox="1"/>
-          <p:nvPr/>
-        </p:nvSpPr>
-        <p:spPr>
-          <a:xfrm>
-            <a:off x="9732754" y="5278164"/>
-            <a:ext cx="1821162" cy="353371"/>
-          </a:xfrm>
-          <a:prstGeom prst="rect">
-            <a:avLst/>
-          </a:prstGeom>
-          <a:noFill/>
-        </p:spPr>
-        <p:txBody>
-          <a:bodyPr wrap="none" rtlCol="0">
-            <a:spAutoFit/>
-          </a:bodyPr>
-          <a:lstStyle/>
-          <a:p>
-            <a:r>
-              <a:rPr lang="en-US">
-                <a:latin typeface="Arial"/>
-                <a:cs typeface="Arial"/>
-              </a:rPr>
-              <a:t>Final intra period</a:t>
-            </a:r>
-          </a:p>
-        </p:txBody>
-      </p:sp>
-      <p:sp>
-        <p:nvSpPr>
-          <p:cNvPr id="82" name="Left Brace 81"/>
-          <p:cNvSpPr/>
-          <p:nvPr/>
-        </p:nvSpPr>
-        <p:spPr>
-          <a:xfrm rot="16200000">
-            <a:off x="10557262" y="4716312"/>
-            <a:ext cx="214334" cy="909371"/>
-          </a:xfrm>
-          <a:prstGeom prst="leftBrace">
-            <a:avLst/>
-          </a:prstGeom>
-        </p:spPr>
-        <p:style>
-          <a:lnRef idx="2">
-            <a:schemeClr val="dk1"/>
-          </a:lnRef>
-          <a:fillRef idx="0">
-            <a:schemeClr val="dk1"/>
-          </a:fillRef>
-          <a:effectRef idx="1">
-            <a:schemeClr val="dk1"/>
-          </a:effectRef>
-          <a:fontRef idx="minor">
-            <a:schemeClr val="tx1"/>
-          </a:fontRef>
-        </p:style>
-        <p:txBody>
-          <a:bodyPr rtlCol="0" anchor="ctr"/>
-          <a:lstStyle/>
-          <a:p>
-            <a:pPr algn="ctr"/>
-            <a:endParaRPr lang="en-US">
-              <a:latin typeface="Arial"/>
-              <a:cs typeface="Arial"/>
-            </a:endParaRPr>
+              <a:t>Common atlas frame (CAF)</a:t>
+            </a:r>
           </a:p>
         </p:txBody>
       </p:sp>
       <p:cxnSp>
         <p:nvCxnSpPr>
           <p:cNvPr id="85" name="Straight Connector 84"/>
-          <p:cNvCxnSpPr/>
+          <p:cNvCxnSpPr>
+            <a:cxnSpLocks/>
+          </p:cNvCxnSpPr>
           <p:nvPr/>
         </p:nvCxnSpPr>
         <p:spPr>
           <a:xfrm>
-            <a:off x="3972945" y="1364514"/>
-            <a:ext cx="7378858" cy="1892706"/>
+            <a:off x="3157832" y="1372933"/>
+            <a:ext cx="5268485" cy="1883358"/>
           </a:xfrm>
           <a:prstGeom prst="line">
             <a:avLst/>
@@ -4838,14 +5417,22 @@
       </p:cxnSp>
       <p:cxnSp>
         <p:nvCxnSpPr>
-          <p:cNvPr id="88" name="Straight Connector 87"/>
-          <p:cNvCxnSpPr/>
+          <p:cNvPr id="76" name="Straight Connector 75">
+            <a:extLst>
+              <a:ext uri="{FF2B5EF4-FFF2-40B4-BE49-F238E27FC236}">
+                <a16:creationId xmlns:a16="http://schemas.microsoft.com/office/drawing/2014/main" id="{E1D61E38-2F28-45D9-9DA8-EA51C1673F4E}"/>
+              </a:ext>
+            </a:extLst>
+          </p:cNvPr>
+          <p:cNvCxnSpPr>
+            <a:cxnSpLocks/>
+          </p:cNvCxnSpPr>
           <p:nvPr/>
         </p:nvCxnSpPr>
         <p:spPr>
-          <a:xfrm flipH="1">
-            <a:off x="3241455" y="1372941"/>
-            <a:ext cx="79759" cy="1884279"/>
+          <a:xfrm>
+            <a:off x="6142907" y="1364512"/>
+            <a:ext cx="6863726" cy="1891779"/>
           </a:xfrm>
           <a:prstGeom prst="line">
             <a:avLst/>
@@ -4875,12 +5462,153 @@
           </a:fontRef>
         </p:style>
       </p:cxnSp>
-      <p:sp>
-        <p:nvSpPr>
-          <p:cNvPr id="37" name="Rectangle 36">
+      <p:cxnSp>
+        <p:nvCxnSpPr>
+          <p:cNvPr id="79" name="Straight Connector 78">
             <a:extLst>
               <a:ext uri="{FF2B5EF4-FFF2-40B4-BE49-F238E27FC236}">
-                <a16:creationId xmlns:a16="http://schemas.microsoft.com/office/drawing/2014/main" id="{D0E482D7-0410-45FD-A83F-0225FC138F75}"/>
+                <a16:creationId xmlns:a16="http://schemas.microsoft.com/office/drawing/2014/main" id="{2CC137AF-C9AE-4C3F-8925-C7962109B238}"/>
+              </a:ext>
+            </a:extLst>
+          </p:cNvPr>
+          <p:cNvCxnSpPr>
+            <a:cxnSpLocks/>
+          </p:cNvCxnSpPr>
+          <p:nvPr/>
+        </p:nvCxnSpPr>
+        <p:spPr>
+          <a:xfrm>
+            <a:off x="5481802" y="1372932"/>
+            <a:ext cx="5696102" cy="1891775"/>
+          </a:xfrm>
+          <a:prstGeom prst="line">
+            <a:avLst/>
+          </a:prstGeom>
+          <a:ln w="9525" cap="flat" cmpd="sng" algn="ctr">
+            <a:solidFill>
+              <a:schemeClr val="dk1"/>
+            </a:solidFill>
+            <a:prstDash val="dash"/>
+            <a:round/>
+            <a:headEnd type="none" w="med" len="med"/>
+            <a:tailEnd type="none" w="med" len="med"/>
+          </a:ln>
+        </p:spPr>
+        <p:style>
+          <a:lnRef idx="0">
+            <a:scrgbClr r="0" g="0" b="0"/>
+          </a:lnRef>
+          <a:fillRef idx="0">
+            <a:scrgbClr r="0" g="0" b="0"/>
+          </a:fillRef>
+          <a:effectRef idx="0">
+            <a:scrgbClr r="0" g="0" b="0"/>
+          </a:effectRef>
+          <a:fontRef idx="minor">
+            <a:schemeClr val="tx1"/>
+          </a:fontRef>
+        </p:style>
+      </p:cxnSp>
+      <p:cxnSp>
+        <p:nvCxnSpPr>
+          <p:cNvPr id="83" name="Straight Connector 82">
+            <a:extLst>
+              <a:ext uri="{FF2B5EF4-FFF2-40B4-BE49-F238E27FC236}">
+                <a16:creationId xmlns:a16="http://schemas.microsoft.com/office/drawing/2014/main" id="{0300BC94-FBA8-43BE-B603-53C064B4B16C}"/>
+              </a:ext>
+            </a:extLst>
+          </p:cNvPr>
+          <p:cNvCxnSpPr>
+            <a:cxnSpLocks/>
+          </p:cNvCxnSpPr>
+          <p:nvPr/>
+        </p:nvCxnSpPr>
+        <p:spPr>
+          <a:xfrm>
+            <a:off x="5423706" y="1372932"/>
+            <a:ext cx="5526097" cy="1884287"/>
+          </a:xfrm>
+          <a:prstGeom prst="line">
+            <a:avLst/>
+          </a:prstGeom>
+          <a:ln w="9525" cap="flat" cmpd="sng" algn="ctr">
+            <a:solidFill>
+              <a:schemeClr val="dk1"/>
+            </a:solidFill>
+            <a:prstDash val="dash"/>
+            <a:round/>
+            <a:headEnd type="none" w="med" len="med"/>
+            <a:tailEnd type="none" w="med" len="med"/>
+          </a:ln>
+        </p:spPr>
+        <p:style>
+          <a:lnRef idx="0">
+            <a:scrgbClr r="0" g="0" b="0"/>
+          </a:lnRef>
+          <a:fillRef idx="0">
+            <a:scrgbClr r="0" g="0" b="0"/>
+          </a:fillRef>
+          <a:effectRef idx="0">
+            <a:scrgbClr r="0" g="0" b="0"/>
+          </a:effectRef>
+          <a:fontRef idx="minor">
+            <a:schemeClr val="tx1"/>
+          </a:fontRef>
+        </p:style>
+      </p:cxnSp>
+      <p:cxnSp>
+        <p:nvCxnSpPr>
+          <p:cNvPr id="84" name="Straight Connector 83">
+            <a:extLst>
+              <a:ext uri="{FF2B5EF4-FFF2-40B4-BE49-F238E27FC236}">
+                <a16:creationId xmlns:a16="http://schemas.microsoft.com/office/drawing/2014/main" id="{994D9BB3-06B8-4575-B373-C157025E4ED0}"/>
+              </a:ext>
+            </a:extLst>
+          </p:cNvPr>
+          <p:cNvCxnSpPr>
+            <a:cxnSpLocks/>
+          </p:cNvCxnSpPr>
+          <p:nvPr/>
+        </p:nvCxnSpPr>
+        <p:spPr>
+          <a:xfrm>
+            <a:off x="4427423" y="1380429"/>
+            <a:ext cx="4688730" cy="1885208"/>
+          </a:xfrm>
+          <a:prstGeom prst="line">
+            <a:avLst/>
+          </a:prstGeom>
+          <a:ln w="9525" cap="flat" cmpd="sng" algn="ctr">
+            <a:solidFill>
+              <a:schemeClr val="dk1"/>
+            </a:solidFill>
+            <a:prstDash val="dash"/>
+            <a:round/>
+            <a:headEnd type="none" w="med" len="med"/>
+            <a:tailEnd type="none" w="med" len="med"/>
+          </a:ln>
+        </p:spPr>
+        <p:style>
+          <a:lnRef idx="0">
+            <a:scrgbClr r="0" g="0" b="0"/>
+          </a:lnRef>
+          <a:fillRef idx="0">
+            <a:scrgbClr r="0" g="0" b="0"/>
+          </a:fillRef>
+          <a:effectRef idx="0">
+            <a:scrgbClr r="0" g="0" b="0"/>
+          </a:effectRef>
+          <a:fontRef idx="minor">
+            <a:schemeClr val="tx1"/>
+          </a:fontRef>
+        </p:style>
+      </p:cxnSp>
+      <p:sp>
+        <p:nvSpPr>
+          <p:cNvPr id="71" name="Rectangle 70">
+            <a:extLst>
+              <a:ext uri="{FF2B5EF4-FFF2-40B4-BE49-F238E27FC236}">
+                <a16:creationId xmlns:a16="http://schemas.microsoft.com/office/drawing/2014/main" id="{C2950640-D5C8-4682-98F2-9D2A72450643}"/>
               </a:ext>
             </a:extLst>
           </p:cNvPr>
@@ -4889,15 +5617,12 @@
         </p:nvSpPr>
         <p:spPr>
           <a:xfrm>
-            <a:off x="7434906" y="1364514"/>
-            <a:ext cx="1044233" cy="782358"/>
+            <a:off x="2300684" y="4207892"/>
+            <a:ext cx="1914241" cy="445918"/>
           </a:xfrm>
           <a:prstGeom prst="rect">
             <a:avLst/>
           </a:prstGeom>
-          <a:ln>
-            <a:prstDash val="solid"/>
-          </a:ln>
         </p:spPr>
         <p:style>
           <a:lnRef idx="2">
@@ -4919,64 +5644,11 @@
           <a:p>
             <a:pPr algn="ctr"/>
             <a:r>
-              <a:rPr lang="en-US" sz="1300">
+              <a:rPr lang="en-US" sz="1400" dirty="0">
                 <a:latin typeface="Arial"/>
                 <a:cs typeface="Arial"/>
               </a:rPr>
-              <a:t>Occupancy video data</a:t>
-            </a:r>
-          </a:p>
-        </p:txBody>
-      </p:sp>
-      <p:sp>
-        <p:nvSpPr>
-          <p:cNvPr id="38" name="Rectangle 37">
-            <a:extLst>
-              <a:ext uri="{FF2B5EF4-FFF2-40B4-BE49-F238E27FC236}">
-                <a16:creationId xmlns:a16="http://schemas.microsoft.com/office/drawing/2014/main" id="{C60CCC2A-C0ED-42F1-B1EA-A1045AB59AB3}"/>
-              </a:ext>
-            </a:extLst>
-          </p:cNvPr>
-          <p:cNvSpPr/>
-          <p:nvPr/>
-        </p:nvSpPr>
-        <p:spPr>
-          <a:xfrm>
-            <a:off x="10990387" y="1356086"/>
-            <a:ext cx="1044233" cy="782358"/>
-          </a:xfrm>
-          <a:prstGeom prst="rect">
-            <a:avLst/>
-          </a:prstGeom>
-          <a:ln>
-            <a:prstDash val="solid"/>
-          </a:ln>
-        </p:spPr>
-        <p:style>
-          <a:lnRef idx="2">
-            <a:schemeClr val="dk1"/>
-          </a:lnRef>
-          <a:fillRef idx="1">
-            <a:schemeClr val="lt1"/>
-          </a:fillRef>
-          <a:effectRef idx="0">
-            <a:schemeClr val="dk1"/>
-          </a:effectRef>
-          <a:fontRef idx="minor">
-            <a:schemeClr val="dk1"/>
-          </a:fontRef>
-        </p:style>
-        <p:txBody>
-          <a:bodyPr lIns="91440" tIns="45720" rIns="91440" bIns="45720" rtlCol="0" anchor="ctr"/>
-          <a:lstStyle/>
-          <a:p>
-            <a:pPr algn="ctr"/>
-            <a:r>
-              <a:rPr lang="en-US" sz="1300">
-                <a:latin typeface="Arial"/>
-                <a:cs typeface="Arial"/>
-              </a:rPr>
-              <a:t>Occupancy video data</a:t>
+              <a:t>View parameters list</a:t>
             </a:r>
           </a:p>
         </p:txBody>

</xml_diff>